<commit_message>
Minor fixes to Custom Properties slide deck
</commit_message>
<xml_diff>
--- a/02 customprops.pptx
+++ b/02 customprops.pptx
@@ -264,7 +264,7 @@
               <a:rPr lang="en-US" smtClean="0">
                 <a:latin typeface="Segoe UI" pitchFamily="34" charset="0"/>
               </a:rPr>
-              <a:t>1/7/19 3:47 PM</a:t>
+              <a:t>3/2/2019 4:54 PM</a:t>
             </a:fld>
             <a:endParaRPr lang="en-US" dirty="0">
               <a:latin typeface="Segoe UI" pitchFamily="34" charset="0"/>
@@ -561,7 +561,7 @@
           <a:p>
             <a:fld id="{D18B56EA-E28F-4F92-9F16-7A6F2501B303}" type="datetime8">
               <a:rPr lang="en-US" smtClean="0"/>
-              <a:t>1/7/19 3:47 PM</a:t>
+              <a:t>3/2/2019 4:54 PM</a:t>
             </a:fld>
             <a:endParaRPr lang="en-US" dirty="0"/>
           </a:p>
@@ -944,7 +944,7 @@
           <a:p>
             <a:fld id="{D18B56EA-E28F-4F92-9F16-7A6F2501B303}" type="datetime8">
               <a:rPr lang="en-US" smtClean="0"/>
-              <a:t>1/7/19 3:47 PM</a:t>
+              <a:t>3/2/2019 4:54 PM</a:t>
             </a:fld>
             <a:endParaRPr lang="en-US" dirty="0"/>
           </a:p>
@@ -1125,7 +1125,7 @@
           <a:p>
             <a:fld id="{D18B56EA-E28F-4F92-9F16-7A6F2501B303}" type="datetime8">
               <a:rPr lang="en-US" smtClean="0"/>
-              <a:t>1/7/19 3:47 PM</a:t>
+              <a:t>3/2/2019 4:54 PM</a:t>
             </a:fld>
             <a:endParaRPr lang="en-US" dirty="0"/>
           </a:p>
@@ -1630,7 +1630,7 @@
           <a:p>
             <a:fld id="{D18B56EA-E28F-4F92-9F16-7A6F2501B303}" type="datetime8">
               <a:rPr lang="en-US" smtClean="0"/>
-              <a:t>1/7/19 3:47 PM</a:t>
+              <a:t>3/2/2019 4:54 PM</a:t>
             </a:fld>
             <a:endParaRPr lang="en-US" dirty="0"/>
           </a:p>
@@ -1811,7 +1811,7 @@
           <a:p>
             <a:fld id="{D18B56EA-E28F-4F92-9F16-7A6F2501B303}" type="datetime8">
               <a:rPr lang="en-US" smtClean="0"/>
-              <a:t>1/7/19 3:47 PM</a:t>
+              <a:t>3/2/2019 4:54 PM</a:t>
             </a:fld>
             <a:endParaRPr lang="en-US" dirty="0"/>
           </a:p>
@@ -1992,7 +1992,7 @@
           <a:p>
             <a:fld id="{D18B56EA-E28F-4F92-9F16-7A6F2501B303}" type="datetime8">
               <a:rPr lang="en-US" smtClean="0"/>
-              <a:t>1/7/19 3:47 PM</a:t>
+              <a:t>3/2/2019 4:54 PM</a:t>
             </a:fld>
             <a:endParaRPr lang="en-US" dirty="0"/>
           </a:p>
@@ -2173,7 +2173,7 @@
           <a:p>
             <a:fld id="{D18B56EA-E28F-4F92-9F16-7A6F2501B303}" type="datetime8">
               <a:rPr lang="en-US" smtClean="0"/>
-              <a:t>1/7/19 3:47 PM</a:t>
+              <a:t>3/2/2019 4:54 PM</a:t>
             </a:fld>
             <a:endParaRPr lang="en-US" dirty="0"/>
           </a:p>
@@ -16186,8 +16186,20 @@
                     <a:lumOff val="25000"/>
                   </a:schemeClr>
                 </a:solidFill>
+                <a:hlinkClick r:id="rId5"/>
               </a:rPr>
-              <a:t>https://github.com/SharePoint/sp-dev-fx-webparts/tree/master/samples/react-custompropertypanecontrols </a:t>
+              <a:t>https://github.com/SharePoint/sp-dev-fx-webparts/tree/master/samples/react-custompropertypanecontrols</a:t>
+            </a:r>
+            <a:r>
+              <a:rPr lang="en-US" sz="1600" dirty="0">
+                <a:solidFill>
+                  <a:schemeClr val="tx1">
+                    <a:lumMod val="75000"/>
+                    <a:lumOff val="25000"/>
+                  </a:schemeClr>
+                </a:solidFill>
+              </a:rPr>
+              <a:t>  </a:t>
             </a:r>
           </a:p>
         </p:txBody>
@@ -16907,7 +16919,7 @@
               <a:rPr lang="en-US" sz="1800" dirty="0">
                 <a:latin typeface="+mj-lt"/>
               </a:rPr>
-              <a:t>SharePoint Framework</a:t>
+              <a:t>Overview of the SharePoint Framework</a:t>
             </a:r>
           </a:p>
           <a:p>
@@ -16926,7 +16938,7 @@
                 <a:latin typeface="+mj-lt"/>
                 <a:hlinkClick r:id="rId3"/>
               </a:rPr>
-              <a:t>https://docs.microsoft.com/sharepoint/dev/spfx</a:t>
+              <a:t>https://docs.microsoft.com/sharepoint/dev/spfx/sharepoint-framework-overview</a:t>
             </a:r>
             <a:endParaRPr lang="en-US" sz="1800" dirty="0">
               <a:latin typeface="+mj-lt"/>

</xml_diff>